<commit_message>
added Kotlin to BaaS
</commit_message>
<xml_diff>
--- a/Backend_as_a_Service.pptx
+++ b/Backend_as_a_Service.pptx
@@ -10560,8 +10560,8 @@
         </p:nvSpPr>
         <p:spPr>
           <a:xfrm>
-            <a:off x="-1" y="-1"/>
-            <a:ext cx="10192216" cy="1471961"/>
+            <a:off x="-1" y="0"/>
+            <a:ext cx="5617030" cy="927464"/>
           </a:xfrm>
           <a:prstGeom prst="rect">
             <a:avLst/>
@@ -10590,68 +10590,44 @@
           <a:p>
             <a:pPr lvl="0"/>
             <a:r>
-              <a:rPr lang="en-US" sz="2000" b="1" dirty="0">
+              <a:rPr lang="en-US" sz="1600" b="1" dirty="0">
                 <a:solidFill>
                   <a:srgbClr val="0070C0"/>
                 </a:solidFill>
               </a:rPr>
               <a:t>(Web, iOS, Android)</a:t>
             </a:r>
-            <a:endParaRPr lang="en-US" sz="2000" b="1" dirty="0"/>
+            <a:endParaRPr lang="en-US" sz="1600" b="1" dirty="0"/>
           </a:p>
           <a:p>
             <a:pPr lvl="0"/>
             <a:r>
-              <a:rPr lang="en-US" sz="2000" b="1" dirty="0"/>
-              <a:t>BaaS = Backend as a Service</a:t>
-            </a:r>
-            <a:endParaRPr lang="en-US" sz="2000" b="1" dirty="0">
+              <a:rPr lang="en-US" sz="1600" b="1" dirty="0">
+                <a:solidFill>
+                  <a:srgbClr val="FF0000"/>
+                </a:solidFill>
+              </a:rPr>
+              <a:t>BaaS</a:t>
+            </a:r>
+            <a:r>
+              <a:rPr lang="en-US" sz="1600" b="1" dirty="0"/>
+              <a:t> = Backend as a Service, </a:t>
+            </a:r>
+            <a:r>
+              <a:rPr lang="en-US" sz="1600" b="1" dirty="0" err="1">
+                <a:solidFill>
+                  <a:srgbClr val="FF0000"/>
+                </a:solidFill>
+              </a:rPr>
+              <a:t>MBaaS</a:t>
+            </a:r>
+            <a:r>
+              <a:rPr lang="en-US" sz="1600" b="1" dirty="0"/>
+              <a:t> – Mobile BaaS</a:t>
+            </a:r>
+            <a:endParaRPr lang="en-US" sz="1600" b="1" dirty="0">
               <a:solidFill>
                 <a:srgbClr val="0070C0"/>
-              </a:solidFill>
-            </a:endParaRPr>
-          </a:p>
-          <a:p>
-            <a:pPr lvl="0"/>
-            <a:r>
-              <a:rPr lang="en-US" sz="2000" b="1" dirty="0" err="1"/>
-              <a:t>MBaaS</a:t>
-            </a:r>
-            <a:r>
-              <a:rPr lang="en-US" sz="2000" b="1" dirty="0"/>
-              <a:t> = Mobile BaaS</a:t>
-            </a:r>
-          </a:p>
-          <a:p>
-            <a:pPr lvl="0"/>
-            <a:r>
-              <a:rPr lang="en-US" sz="2000" dirty="0">
-                <a:solidFill>
-                  <a:schemeClr val="tx1"/>
-                </a:solidFill>
-              </a:rPr>
-              <a:t> - </a:t>
-            </a:r>
-            <a:r>
-              <a:rPr lang="en-US" dirty="0">
-                <a:solidFill>
-                  <a:schemeClr val="tx1"/>
-                </a:solidFill>
-                <a:hlinkClick r:id="rId3"/>
-              </a:rPr>
-              <a:t>https://blog.back4app.com/backend-as-a-service-baas/</a:t>
-            </a:r>
-            <a:r>
-              <a:rPr lang="en-US" dirty="0">
-                <a:solidFill>
-                  <a:schemeClr val="tx1"/>
-                </a:solidFill>
-              </a:rPr>
-              <a:t> </a:t>
-            </a:r>
-            <a:endParaRPr dirty="0">
-              <a:solidFill>
-                <a:schemeClr val="tx1"/>
               </a:solidFill>
             </a:endParaRPr>
           </a:p>
@@ -10671,8 +10647,8 @@
         </p:nvSpPr>
         <p:spPr>
           <a:xfrm>
-            <a:off x="5754029" y="543942"/>
-            <a:ext cx="6437971" cy="5816977"/>
+            <a:off x="5754029" y="1410355"/>
+            <a:ext cx="6437971" cy="5447645"/>
           </a:xfrm>
           <a:prstGeom prst="rect">
             <a:avLst/>
@@ -10711,7 +10687,7 @@
             </a:r>
             <a:r>
               <a:rPr lang="en-US" sz="1200" dirty="0">
-                <a:hlinkClick r:id="rId4"/>
+                <a:hlinkClick r:id="rId3"/>
               </a:rPr>
               <a:t>https://firebase.google.com/</a:t>
             </a:r>
@@ -10744,7 +10720,7 @@
             </a:r>
             <a:r>
               <a:rPr lang="en-US" sz="1200" dirty="0">
-                <a:hlinkClick r:id="rId5"/>
+                <a:hlinkClick r:id="rId4"/>
               </a:rPr>
               <a:t>https://www.back4app.com/</a:t>
             </a:r>
@@ -10780,7 +10756,7 @@
             </a:r>
             <a:r>
               <a:rPr lang="en-US" sz="1200" dirty="0">
-                <a:hlinkClick r:id="rId6"/>
+                <a:hlinkClick r:id="rId5"/>
               </a:rPr>
               <a:t>https://aws.amazon.com/amplify/</a:t>
             </a:r>
@@ -10808,7 +10784,7 @@
             </a:r>
             <a:r>
               <a:rPr lang="en-US" sz="1200" dirty="0">
-                <a:hlinkClick r:id="rId7"/>
+                <a:hlinkClick r:id="rId6"/>
               </a:rPr>
               <a:t>https://parseplatform.org/</a:t>
             </a:r>
@@ -10836,7 +10812,7 @@
             </a:r>
             <a:r>
               <a:rPr lang="en-US" sz="1200" dirty="0">
-                <a:hlinkClick r:id="rId8"/>
+                <a:hlinkClick r:id="rId7"/>
               </a:rPr>
               <a:t>https://backendless.com/</a:t>
             </a:r>
@@ -10864,7 +10840,7 @@
             </a:r>
             <a:r>
               <a:rPr lang="en-US" sz="1200" dirty="0">
-                <a:hlinkClick r:id="rId9"/>
+                <a:hlinkClick r:id="rId8"/>
               </a:rPr>
               <a:t>https://developer.apple.com/icloud/cloudkit/</a:t>
             </a:r>
@@ -10892,7 +10868,7 @@
             </a:r>
             <a:r>
               <a:rPr lang="en-US" sz="1200" dirty="0">
-                <a:hlinkClick r:id="rId10"/>
+                <a:hlinkClick r:id="rId9"/>
               </a:rPr>
               <a:t>https://www.progress.com/kinvey</a:t>
             </a:r>
@@ -10920,7 +10896,7 @@
             </a:r>
             <a:r>
               <a:rPr lang="en-US" sz="1200" dirty="0">
-                <a:hlinkClick r:id="rId11"/>
+                <a:hlinkClick r:id="rId10"/>
               </a:rPr>
               <a:t>https://azure.microsoft.com/en-us/services/app-service/mobile/</a:t>
             </a:r>
@@ -10948,7 +10924,7 @@
             </a:r>
             <a:r>
               <a:rPr lang="en-US" sz="1200" dirty="0">
-                <a:hlinkClick r:id="rId12"/>
+                <a:hlinkClick r:id="rId11"/>
               </a:rPr>
               <a:t>https://en.kii.com/</a:t>
             </a:r>
@@ -10976,7 +10952,7 @@
             </a:r>
             <a:r>
               <a:rPr lang="en-US" sz="1200" dirty="0">
-                <a:hlinkClick r:id="rId13"/>
+                <a:hlinkClick r:id="rId12"/>
               </a:rPr>
               <a:t>https://www.kumulos.com/</a:t>
             </a:r>
@@ -11004,7 +10980,7 @@
             </a:r>
             <a:r>
               <a:rPr lang="en-US" sz="1200" dirty="0">
-                <a:hlinkClick r:id="rId14"/>
+                <a:hlinkClick r:id="rId13"/>
               </a:rPr>
               <a:t>https://www.gamesparks.com/</a:t>
             </a:r>
@@ -11032,7 +11008,7 @@
             </a:r>
             <a:r>
               <a:rPr lang="en-US" sz="1200" dirty="0">
-                <a:hlinkClick r:id="rId15"/>
+                <a:hlinkClick r:id="rId14"/>
               </a:rPr>
               <a:t>https://www.8base.com/</a:t>
             </a:r>
@@ -11068,7 +11044,7 @@
             </a:r>
             <a:r>
               <a:rPr lang="en-US" sz="1200" dirty="0">
-                <a:hlinkClick r:id="rId16"/>
+                <a:hlinkClick r:id="rId15"/>
               </a:rPr>
               <a:t>https://kuzzle.io/</a:t>
             </a:r>
@@ -11106,7 +11082,7 @@
             </a:r>
             <a:r>
               <a:rPr lang="en-US" sz="1200" dirty="0">
-                <a:hlinkClick r:id="rId17"/>
+                <a:hlinkClick r:id="rId16"/>
               </a:rPr>
               <a:t>https://playfab.com/</a:t>
             </a:r>
@@ -11142,9 +11118,19 @@
             </a:r>
             <a:r>
               <a:rPr lang="en-US" sz="1200" dirty="0">
+                <a:hlinkClick r:id="rId17"/>
+              </a:rPr>
+              <a:t>https://en.wikipedia.org/wiki/Appcelerator</a:t>
+            </a:r>
+            <a:r>
+              <a:rPr lang="en-US" sz="1200" dirty="0"/>
+              <a:t> - </a:t>
+            </a:r>
+            <a:r>
+              <a:rPr lang="en-US" sz="1200" dirty="0">
                 <a:hlinkClick r:id="rId18"/>
               </a:rPr>
-              <a:t>https://en.wikipedia.org/wiki/Appcelerator</a:t>
+              <a:t>https://appcelerator.com/</a:t>
             </a:r>
             <a:r>
               <a:rPr lang="en-US" sz="1200" dirty="0"/>
@@ -11153,16 +11139,6 @@
             <a:r>
               <a:rPr lang="en-US" sz="1200" dirty="0">
                 <a:hlinkClick r:id="rId19"/>
-              </a:rPr>
-              <a:t>https://appcelerator.com/</a:t>
-            </a:r>
-            <a:r>
-              <a:rPr lang="en-US" sz="1200" dirty="0"/>
-              <a:t> - </a:t>
-            </a:r>
-            <a:r>
-              <a:rPr lang="en-US" sz="1200" dirty="0">
-                <a:hlinkClick r:id="rId20"/>
               </a:rPr>
               <a:t>https://www.appcelerator.org/</a:t>
             </a:r>
@@ -11190,7 +11166,7 @@
             </a:r>
             <a:r>
               <a:rPr lang="en-US" sz="1200" dirty="0">
-                <a:hlinkClick r:id="rId21"/>
+                <a:hlinkClick r:id="rId20"/>
               </a:rPr>
               <a:t>https://docs.mongodb.com/realm/</a:t>
             </a:r>
@@ -11218,7 +11194,7 @@
             </a:r>
             <a:r>
               <a:rPr lang="en-US" sz="1200" dirty="0">
-                <a:hlinkClick r:id="rId22"/>
+                <a:hlinkClick r:id="rId21"/>
               </a:rPr>
               <a:t>https://www.oracle.com/application-development/cloud-services/mobile/</a:t>
             </a:r>
@@ -11246,7 +11222,7 @@
             </a:r>
             <a:r>
               <a:rPr lang="en-US" sz="1200" dirty="0">
-                <a:hlinkClick r:id="rId23"/>
+                <a:hlinkClick r:id="rId22"/>
               </a:rPr>
               <a:t>https://www.ibm.com/cloud/mobile-foundation</a:t>
             </a:r>
@@ -11274,7 +11250,7 @@
             </a:r>
             <a:r>
               <a:rPr lang="en-US" sz="1200" dirty="0">
-                <a:hlinkClick r:id="rId24"/>
+                <a:hlinkClick r:id="rId23"/>
               </a:rPr>
               <a:t>https://www.baqend.com/</a:t>
             </a:r>
@@ -11302,7 +11278,7 @@
             </a:r>
             <a:r>
               <a:rPr lang="en-US" sz="1200" dirty="0">
-                <a:hlinkClick r:id="rId25"/>
+                <a:hlinkClick r:id="rId24"/>
               </a:rPr>
               <a:t>https://www.convertigo.com/</a:t>
             </a:r>
@@ -11330,7 +11306,7 @@
             </a:r>
             <a:r>
               <a:rPr lang="en-US" sz="1200" dirty="0">
-                <a:hlinkClick r:id="rId26"/>
+                <a:hlinkClick r:id="rId25"/>
               </a:rPr>
               <a:t>https://opensource.baasbox.com/</a:t>
             </a:r>
@@ -11358,25 +11334,25 @@
             </a:r>
             <a:r>
               <a:rPr lang="en-US" sz="1200" dirty="0">
+                <a:hlinkClick r:id="rId26"/>
+              </a:rPr>
+              <a:t>http://hood.ie/</a:t>
+            </a:r>
+            <a:r>
+              <a:rPr lang="en-US" sz="1200" dirty="0"/>
+              <a:t> - </a:t>
+            </a:r>
+            <a:r>
+              <a:rPr lang="en-US" sz="1200" dirty="0">
                 <a:hlinkClick r:id="rId27"/>
               </a:rPr>
-              <a:t>http://hood.ie/</a:t>
+              <a:t>https://github.com/hoodiehq</a:t>
             </a:r>
             <a:r>
               <a:rPr lang="en-US" sz="1200" dirty="0"/>
               <a:t> - </a:t>
             </a:r>
             <a:r>
-              <a:rPr lang="en-US" sz="1200" dirty="0">
-                <a:hlinkClick r:id="rId28"/>
-              </a:rPr>
-              <a:t>https://github.com/hoodiehq</a:t>
-            </a:r>
-            <a:r>
-              <a:rPr lang="en-US" sz="1200" dirty="0"/>
-              <a:t> - </a:t>
-            </a:r>
-            <a:r>
               <a:rPr lang="en-US" sz="1200" dirty="0" err="1"/>
               <a:t>Javascript</a:t>
             </a:r>
@@ -11384,9 +11360,6 @@
               <a:rPr lang="en-US" sz="1200" dirty="0"/>
               <a:t> , Offline-First Backend </a:t>
             </a:r>
-          </a:p>
-          <a:p>
-            <a:endParaRPr lang="en-US" sz="1200" dirty="0"/>
           </a:p>
         </p:txBody>
       </p:sp>
@@ -11404,8 +11377,8 @@
         </p:nvSpPr>
         <p:spPr>
           <a:xfrm>
-            <a:off x="-1" y="1922034"/>
-            <a:ext cx="5754030" cy="4062651"/>
+            <a:off x="0" y="3626346"/>
+            <a:ext cx="5754030" cy="3231654"/>
           </a:xfrm>
           <a:prstGeom prst="rect">
             <a:avLst/>
@@ -11419,7 +11392,7 @@
           <a:lstStyle/>
           <a:p>
             <a:r>
-              <a:rPr lang="en-US" sz="2000" b="1" dirty="0"/>
+              <a:rPr lang="en-US" sz="1200" b="1" dirty="0"/>
               <a:t>Typical Features:</a:t>
             </a:r>
           </a:p>
@@ -11429,7 +11402,7 @@
               <a:buChar char="•"/>
             </a:pPr>
             <a:r>
-              <a:rPr lang="en-US" dirty="0"/>
+              <a:rPr lang="en-US" sz="1200" dirty="0"/>
               <a:t>User registration &amp; management, Authentication, Single Sign-on (secure tokens)</a:t>
             </a:r>
           </a:p>
@@ -11439,8 +11412,8 @@
               <a:buChar char="•"/>
             </a:pPr>
             <a:r>
-              <a:rPr lang="en-US" dirty="0"/>
-              <a:t>Messaging, subscriptions, email verification, push notifications, email notifications</a:t>
+              <a:rPr lang="en-US" sz="1200" dirty="0"/>
+              <a:t>Messaging, subscriptions, email verification, push notifications</a:t>
             </a:r>
           </a:p>
           <a:p>
@@ -11449,7 +11422,7 @@
               <a:buChar char="•"/>
             </a:pPr>
             <a:r>
-              <a:rPr lang="en-US" dirty="0"/>
+              <a:rPr lang="en-US" sz="1200" dirty="0"/>
               <a:t>Geolocation</a:t>
             </a:r>
           </a:p>
@@ -11459,7 +11432,7 @@
               <a:buChar char="•"/>
             </a:pPr>
             <a:r>
-              <a:rPr lang="en-US" dirty="0"/>
+              <a:rPr lang="en-US" sz="1200" dirty="0"/>
               <a:t>Chatbots</a:t>
             </a:r>
           </a:p>
@@ -11469,15 +11442,15 @@
               <a:buChar char="•"/>
             </a:pPr>
             <a:r>
-              <a:rPr lang="en-US" dirty="0"/>
+              <a:rPr lang="en-US" sz="1200" dirty="0"/>
               <a:t>API (</a:t>
             </a:r>
             <a:r>
-              <a:rPr lang="en-US" dirty="0" err="1"/>
+              <a:rPr lang="en-US" sz="1200" dirty="0" err="1"/>
               <a:t>GraphQL</a:t>
             </a:r>
             <a:r>
-              <a:rPr lang="en-US" dirty="0"/>
+              <a:rPr lang="en-US" sz="1200" dirty="0"/>
               <a:t> &amp; REST)</a:t>
             </a:r>
           </a:p>
@@ -11487,7 +11460,7 @@
               <a:buChar char="•"/>
             </a:pPr>
             <a:r>
-              <a:rPr lang="en-US" dirty="0"/>
+              <a:rPr lang="en-US" sz="1200" dirty="0"/>
               <a:t>Caching, CDN (Content Delivery Network), Realtime Database for synchronization &amp; conflict resolution</a:t>
             </a:r>
           </a:p>
@@ -11497,7 +11470,7 @@
               <a:buChar char="•"/>
             </a:pPr>
             <a:r>
-              <a:rPr lang="en-US" dirty="0"/>
+              <a:rPr lang="en-US" sz="1200" dirty="0"/>
               <a:t>Storage (files, buckets, databases)</a:t>
             </a:r>
           </a:p>
@@ -11507,7 +11480,7 @@
               <a:buChar char="•"/>
             </a:pPr>
             <a:r>
-              <a:rPr lang="en-US" dirty="0"/>
+              <a:rPr lang="en-US" sz="1200" dirty="0"/>
               <a:t>A/B Testing, Analytics, AI/ML - Predictions, translations, ...</a:t>
             </a:r>
           </a:p>
@@ -11517,7 +11490,7 @@
               <a:buChar char="•"/>
             </a:pPr>
             <a:r>
-              <a:rPr lang="en-US" dirty="0"/>
+              <a:rPr lang="en-US" sz="1200" dirty="0"/>
               <a:t>Social Media Integration (Facebook, LinkedIn, Twitter, etc.)</a:t>
             </a:r>
           </a:p>
@@ -11527,7 +11500,7 @@
               <a:buChar char="•"/>
             </a:pPr>
             <a:r>
-              <a:rPr lang="en-US" dirty="0"/>
+              <a:rPr lang="en-US" sz="1200" dirty="0"/>
               <a:t>Logging, Performance monitoring, Crash Reporting</a:t>
             </a:r>
           </a:p>
@@ -11537,7 +11510,7 @@
               <a:buChar char="•"/>
             </a:pPr>
             <a:r>
-              <a:rPr lang="en-US" dirty="0"/>
+              <a:rPr lang="en-US" sz="1200" dirty="0"/>
               <a:t>Infrastructure (Security settings, auto-scaling, load-balancing, data replication, data backup, DB optimization)</a:t>
             </a:r>
           </a:p>
@@ -11547,9 +11520,103 @@
               <a:buChar char="•"/>
             </a:pPr>
             <a:r>
-              <a:rPr lang="en-US" dirty="0"/>
-              <a:t>Supports multiple frontend technologies: React Native, iOS Native (Swift or Objective-C), Android Native, Ionic, Xamarin, Flutter, ...</a:t>
-            </a:r>
+              <a:rPr lang="en-US" sz="1200" dirty="0"/>
+              <a:t>Supports multiple frontend technologies: React Native, iOS Native (Swift or Objective-C), Kotlin, Android Native, Ionic, Xamarin, Flutter, ...</a:t>
+            </a:r>
+          </a:p>
+        </p:txBody>
+      </p:sp>
+      <p:pic>
+        <p:nvPicPr>
+          <p:cNvPr id="3" name="Picture 2">
+            <a:extLst>
+              <a:ext uri="{FF2B5EF4-FFF2-40B4-BE49-F238E27FC236}">
+                <a16:creationId xmlns:a16="http://schemas.microsoft.com/office/drawing/2014/main" id="{F4B733A4-8B59-9A4D-BAB0-C81CEBCEDA97}"/>
+              </a:ext>
+            </a:extLst>
+          </p:cNvPr>
+          <p:cNvPicPr>
+            <a:picLocks noChangeAspect="1"/>
+          </p:cNvPicPr>
+          <p:nvPr/>
+        </p:nvPicPr>
+        <p:blipFill rotWithShape="1">
+          <a:blip r:embed="rId28" cstate="email">
+            <a:extLst>
+              <a:ext uri="{28A0092B-C50C-407E-A947-70E740481C1C}">
+                <a14:useLocalDpi xmlns:a14="http://schemas.microsoft.com/office/drawing/2010/main"/>
+              </a:ext>
+            </a:extLst>
+          </a:blip>
+          <a:srcRect/>
+          <a:stretch/>
+        </p:blipFill>
+        <p:spPr>
+          <a:xfrm>
+            <a:off x="156755" y="992780"/>
+            <a:ext cx="5185953" cy="2459514"/>
+          </a:xfrm>
+          <a:prstGeom prst="rect">
+            <a:avLst/>
+          </a:prstGeom>
+        </p:spPr>
+      </p:pic>
+      <p:sp>
+        <p:nvSpPr>
+          <p:cNvPr id="4" name="TextBox 3">
+            <a:extLst>
+              <a:ext uri="{FF2B5EF4-FFF2-40B4-BE49-F238E27FC236}">
+                <a16:creationId xmlns:a16="http://schemas.microsoft.com/office/drawing/2014/main" id="{DD4D19FC-4CED-F946-99CB-F72B3906D406}"/>
+              </a:ext>
+            </a:extLst>
+          </p:cNvPr>
+          <p:cNvSpPr txBox="1"/>
+          <p:nvPr/>
+        </p:nvSpPr>
+        <p:spPr>
+          <a:xfrm>
+            <a:off x="6387737" y="365760"/>
+            <a:ext cx="4245429" cy="461665"/>
+          </a:xfrm>
+          <a:prstGeom prst="rect">
+            <a:avLst/>
+          </a:prstGeom>
+          <a:noFill/>
+        </p:spPr>
+        <p:txBody>
+          <a:bodyPr wrap="square" rtlCol="0">
+            <a:spAutoFit/>
+          </a:bodyPr>
+          <a:lstStyle/>
+          <a:p>
+            <a:r>
+              <a:rPr lang="en-US" sz="1200" dirty="0">
+                <a:solidFill>
+                  <a:schemeClr val="tx1"/>
+                </a:solidFill>
+              </a:rPr>
+              <a:t>Review:</a:t>
+            </a:r>
+          </a:p>
+          <a:p>
+            <a:r>
+              <a:rPr lang="en-US" sz="1200" dirty="0">
+                <a:solidFill>
+                  <a:schemeClr val="tx1"/>
+                </a:solidFill>
+              </a:rPr>
+              <a:t> - </a:t>
+            </a:r>
+            <a:r>
+              <a:rPr lang="en-US" sz="1200" dirty="0">
+                <a:solidFill>
+                  <a:schemeClr val="tx1"/>
+                </a:solidFill>
+                <a:hlinkClick r:id="rId29"/>
+              </a:rPr>
+              <a:t>https://blog.back4app.com/backend-as-a-service-baas/ </a:t>
+            </a:r>
+            <a:endParaRPr lang="en-US" sz="1200" dirty="0"/>
           </a:p>
         </p:txBody>
       </p:sp>

</xml_diff>